<commit_message>
poster with algorithm, motivation, problem, solution and diagrams
</commit_message>
<xml_diff>
--- a/poster/poster.pptx
+++ b/poster/poster.pptx
@@ -804,678 +804,6 @@
 </c:chartSpace>
 </file>
 
-<file path=ppt/charts/chart2.xml><?xml version="1.0" encoding="utf-8"?>
-<c:chartSpace xmlns:c="http://schemas.openxmlformats.org/drawingml/2006/chart" xmlns:a="http://schemas.openxmlformats.org/drawingml/2006/main" xmlns:r="http://schemas.openxmlformats.org/officeDocument/2006/relationships" xmlns:c16r2="http://schemas.microsoft.com/office/drawing/2015/06/chart">
-  <c:date1904 val="0"/>
-  <c:lang val="en-US"/>
-  <c:roundedCorners val="0"/>
-  <mc:AlternateContent xmlns:mc="http://schemas.openxmlformats.org/markup-compatibility/2006">
-    <mc:Choice xmlns:c14="http://schemas.microsoft.com/office/drawing/2007/8/2/chart" Requires="c14">
-      <c14:style val="102"/>
-    </mc:Choice>
-    <mc:Fallback>
-      <c:style val="2"/>
-    </mc:Fallback>
-  </mc:AlternateContent>
-  <c:chart>
-    <c:title>
-      <c:overlay val="0"/>
-      <c:spPr>
-        <a:noFill/>
-        <a:ln>
-          <a:noFill/>
-        </a:ln>
-        <a:effectLst/>
-      </c:spPr>
-      <c:txPr>
-        <a:bodyPr rot="0" spcFirstLastPara="1" vertOverflow="ellipsis" vert="horz" wrap="square" anchor="ctr" anchorCtr="1"/>
-        <a:lstStyle/>
-        <a:p>
-          <a:pPr>
-            <a:defRPr sz="1862" b="0" i="0" u="none" strike="noStrike" kern="1200" spc="0" baseline="0">
-              <a:solidFill>
-                <a:schemeClr val="tx1">
-                  <a:lumMod val="65000"/>
-                  <a:lumOff val="35000"/>
-                </a:schemeClr>
-              </a:solidFill>
-              <a:latin typeface="+mn-lt"/>
-              <a:ea typeface="+mn-ea"/>
-              <a:cs typeface="+mn-cs"/>
-            </a:defRPr>
-          </a:pPr>
-          <a:endParaRPr lang="en-US"/>
-        </a:p>
-      </c:txPr>
-    </c:title>
-    <c:autoTitleDeleted val="0"/>
-    <c:plotArea>
-      <c:layout/>
-      <c:lineChart>
-        <c:grouping val="standard"/>
-        <c:varyColors val="0"/>
-        <c:ser>
-          <c:idx val="0"/>
-          <c:order val="0"/>
-          <c:tx>
-            <c:strRef>
-              <c:f>Sheet1!$B$1</c:f>
-              <c:strCache>
-                <c:ptCount val="1"/>
-                <c:pt idx="0">
-                  <c:v>Series 1</c:v>
-                </c:pt>
-              </c:strCache>
-            </c:strRef>
-          </c:tx>
-          <c:spPr>
-            <a:ln w="28575" cap="rnd">
-              <a:solidFill>
-                <a:schemeClr val="accent1"/>
-              </a:solidFill>
-              <a:round/>
-            </a:ln>
-            <a:effectLst/>
-          </c:spPr>
-          <c:marker>
-            <c:symbol val="none"/>
-          </c:marker>
-          <c:dLbls>
-            <c:dLbl>
-              <c:idx val="3"/>
-              <c:dLblPos val="r"/>
-              <c:showLegendKey val="0"/>
-              <c:showVal val="1"/>
-              <c:showCatName val="0"/>
-              <c:showSerName val="1"/>
-              <c:showPercent val="0"/>
-              <c:showBubbleSize val="0"/>
-              <c:extLst>
-                <c:ext xmlns:c15="http://schemas.microsoft.com/office/drawing/2012/chart" uri="{CE6537A1-D6FC-4f65-9D91-7224C49458BB}"/>
-                <c:ext xmlns:c16="http://schemas.microsoft.com/office/drawing/2014/chart" uri="{C3380CC4-5D6E-409C-BE32-E72D297353CC}">
-                  <c16:uniqueId val="{00000000-4363-455B-8FCB-A6D9C29762D6}"/>
-                </c:ext>
-              </c:extLst>
-            </c:dLbl>
-            <c:spPr>
-              <a:noFill/>
-              <a:ln>
-                <a:noFill/>
-              </a:ln>
-              <a:effectLst/>
-            </c:spPr>
-            <c:txPr>
-              <a:bodyPr rot="0" spcFirstLastPara="1" vertOverflow="ellipsis" vert="horz" wrap="square" lIns="38100" tIns="19050" rIns="38100" bIns="19050" anchor="ctr" anchorCtr="1">
-                <a:spAutoFit/>
-              </a:bodyPr>
-              <a:lstStyle/>
-              <a:p>
-                <a:pPr>
-                  <a:defRPr sz="1197" b="0" i="0" u="none" strike="noStrike" kern="1200" baseline="0">
-                    <a:solidFill>
-                      <a:schemeClr val="tx1">
-                        <a:lumMod val="75000"/>
-                        <a:lumOff val="25000"/>
-                      </a:schemeClr>
-                    </a:solidFill>
-                    <a:latin typeface="+mn-lt"/>
-                    <a:ea typeface="+mn-ea"/>
-                    <a:cs typeface="+mn-cs"/>
-                  </a:defRPr>
-                </a:pPr>
-                <a:endParaRPr lang="en-US"/>
-              </a:p>
-            </c:txPr>
-            <c:showLegendKey val="0"/>
-            <c:showVal val="0"/>
-            <c:showCatName val="0"/>
-            <c:showSerName val="0"/>
-            <c:showPercent val="0"/>
-            <c:showBubbleSize val="0"/>
-            <c:extLst>
-              <c:ext xmlns:c15="http://schemas.microsoft.com/office/drawing/2012/chart" uri="{CE6537A1-D6FC-4f65-9D91-7224C49458BB}">
-                <c15:showLeaderLines val="1"/>
-                <c15:leaderLines>
-                  <c:spPr>
-                    <a:ln w="9525" cap="flat" cmpd="sng" algn="ctr">
-                      <a:solidFill>
-                        <a:schemeClr val="tx1">
-                          <a:lumMod val="35000"/>
-                          <a:lumOff val="65000"/>
-                        </a:schemeClr>
-                      </a:solidFill>
-                      <a:round/>
-                    </a:ln>
-                    <a:effectLst/>
-                  </c:spPr>
-                </c15:leaderLines>
-              </c:ext>
-            </c:extLst>
-          </c:dLbls>
-          <c:cat>
-            <c:strRef>
-              <c:f>Sheet1!$A$2:$A$5</c:f>
-              <c:strCache>
-                <c:ptCount val="4"/>
-                <c:pt idx="0">
-                  <c:v>Category 1</c:v>
-                </c:pt>
-                <c:pt idx="1">
-                  <c:v>Category 2</c:v>
-                </c:pt>
-                <c:pt idx="2">
-                  <c:v>Category 3</c:v>
-                </c:pt>
-                <c:pt idx="3">
-                  <c:v>Category 4</c:v>
-                </c:pt>
-              </c:strCache>
-            </c:strRef>
-          </c:cat>
-          <c:val>
-            <c:numRef>
-              <c:f>Sheet1!$B$2:$B$5</c:f>
-              <c:numCache>
-                <c:formatCode>General</c:formatCode>
-                <c:ptCount val="4"/>
-                <c:pt idx="0">
-                  <c:v>4.3</c:v>
-                </c:pt>
-                <c:pt idx="1">
-                  <c:v>2.5</c:v>
-                </c:pt>
-                <c:pt idx="2">
-                  <c:v>3.5</c:v>
-                </c:pt>
-                <c:pt idx="3">
-                  <c:v>4.5</c:v>
-                </c:pt>
-              </c:numCache>
-            </c:numRef>
-          </c:val>
-          <c:smooth val="0"/>
-          <c:extLst>
-            <c:ext xmlns:c16="http://schemas.microsoft.com/office/drawing/2014/chart" uri="{C3380CC4-5D6E-409C-BE32-E72D297353CC}">
-              <c16:uniqueId val="{00000001-4363-455B-8FCB-A6D9C29762D6}"/>
-            </c:ext>
-          </c:extLst>
-        </c:ser>
-        <c:ser>
-          <c:idx val="1"/>
-          <c:order val="1"/>
-          <c:tx>
-            <c:strRef>
-              <c:f>Sheet1!$C$1</c:f>
-              <c:strCache>
-                <c:ptCount val="1"/>
-                <c:pt idx="0">
-                  <c:v>Series 2</c:v>
-                </c:pt>
-              </c:strCache>
-            </c:strRef>
-          </c:tx>
-          <c:spPr>
-            <a:ln w="28575" cap="rnd">
-              <a:solidFill>
-                <a:schemeClr val="accent2"/>
-              </a:solidFill>
-              <a:round/>
-            </a:ln>
-            <a:effectLst/>
-          </c:spPr>
-          <c:marker>
-            <c:symbol val="none"/>
-          </c:marker>
-          <c:dLbls>
-            <c:dLbl>
-              <c:idx val="3"/>
-              <c:dLblPos val="r"/>
-              <c:showLegendKey val="0"/>
-              <c:showVal val="1"/>
-              <c:showCatName val="0"/>
-              <c:showSerName val="1"/>
-              <c:showPercent val="0"/>
-              <c:showBubbleSize val="0"/>
-              <c:extLst>
-                <c:ext xmlns:c15="http://schemas.microsoft.com/office/drawing/2012/chart" uri="{CE6537A1-D6FC-4f65-9D91-7224C49458BB}"/>
-                <c:ext xmlns:c16="http://schemas.microsoft.com/office/drawing/2014/chart" uri="{C3380CC4-5D6E-409C-BE32-E72D297353CC}">
-                  <c16:uniqueId val="{00000002-4363-455B-8FCB-A6D9C29762D6}"/>
-                </c:ext>
-              </c:extLst>
-            </c:dLbl>
-            <c:spPr>
-              <a:noFill/>
-              <a:ln>
-                <a:noFill/>
-              </a:ln>
-              <a:effectLst/>
-            </c:spPr>
-            <c:txPr>
-              <a:bodyPr rot="0" spcFirstLastPara="1" vertOverflow="ellipsis" vert="horz" wrap="square" lIns="38100" tIns="19050" rIns="38100" bIns="19050" anchor="ctr" anchorCtr="1">
-                <a:spAutoFit/>
-              </a:bodyPr>
-              <a:lstStyle/>
-              <a:p>
-                <a:pPr>
-                  <a:defRPr sz="1197" b="0" i="0" u="none" strike="noStrike" kern="1200" baseline="0">
-                    <a:solidFill>
-                      <a:schemeClr val="tx1">
-                        <a:lumMod val="75000"/>
-                        <a:lumOff val="25000"/>
-                      </a:schemeClr>
-                    </a:solidFill>
-                    <a:latin typeface="+mn-lt"/>
-                    <a:ea typeface="+mn-ea"/>
-                    <a:cs typeface="+mn-cs"/>
-                  </a:defRPr>
-                </a:pPr>
-                <a:endParaRPr lang="en-US"/>
-              </a:p>
-            </c:txPr>
-            <c:showLegendKey val="0"/>
-            <c:showVal val="0"/>
-            <c:showCatName val="0"/>
-            <c:showSerName val="0"/>
-            <c:showPercent val="0"/>
-            <c:showBubbleSize val="0"/>
-            <c:extLst>
-              <c:ext xmlns:c15="http://schemas.microsoft.com/office/drawing/2012/chart" uri="{CE6537A1-D6FC-4f65-9D91-7224C49458BB}">
-                <c15:showLeaderLines val="1"/>
-                <c15:leaderLines>
-                  <c:spPr>
-                    <a:ln w="9525" cap="flat" cmpd="sng" algn="ctr">
-                      <a:solidFill>
-                        <a:schemeClr val="tx1">
-                          <a:lumMod val="35000"/>
-                          <a:lumOff val="65000"/>
-                        </a:schemeClr>
-                      </a:solidFill>
-                      <a:round/>
-                    </a:ln>
-                    <a:effectLst/>
-                  </c:spPr>
-                </c15:leaderLines>
-              </c:ext>
-            </c:extLst>
-          </c:dLbls>
-          <c:cat>
-            <c:strRef>
-              <c:f>Sheet1!$A$2:$A$5</c:f>
-              <c:strCache>
-                <c:ptCount val="4"/>
-                <c:pt idx="0">
-                  <c:v>Category 1</c:v>
-                </c:pt>
-                <c:pt idx="1">
-                  <c:v>Category 2</c:v>
-                </c:pt>
-                <c:pt idx="2">
-                  <c:v>Category 3</c:v>
-                </c:pt>
-                <c:pt idx="3">
-                  <c:v>Category 4</c:v>
-                </c:pt>
-              </c:strCache>
-            </c:strRef>
-          </c:cat>
-          <c:val>
-            <c:numRef>
-              <c:f>Sheet1!$C$2:$C$5</c:f>
-              <c:numCache>
-                <c:formatCode>General</c:formatCode>
-                <c:ptCount val="4"/>
-                <c:pt idx="0">
-                  <c:v>2.4</c:v>
-                </c:pt>
-                <c:pt idx="1">
-                  <c:v>4.4000000000000004</c:v>
-                </c:pt>
-                <c:pt idx="2">
-                  <c:v>1.8</c:v>
-                </c:pt>
-                <c:pt idx="3">
-                  <c:v>2.8</c:v>
-                </c:pt>
-              </c:numCache>
-            </c:numRef>
-          </c:val>
-          <c:smooth val="0"/>
-          <c:extLst>
-            <c:ext xmlns:c16="http://schemas.microsoft.com/office/drawing/2014/chart" uri="{C3380CC4-5D6E-409C-BE32-E72D297353CC}">
-              <c16:uniqueId val="{00000003-4363-455B-8FCB-A6D9C29762D6}"/>
-            </c:ext>
-          </c:extLst>
-        </c:ser>
-        <c:ser>
-          <c:idx val="2"/>
-          <c:order val="2"/>
-          <c:tx>
-            <c:strRef>
-              <c:f>Sheet1!$D$1</c:f>
-              <c:strCache>
-                <c:ptCount val="1"/>
-                <c:pt idx="0">
-                  <c:v>Series 3</c:v>
-                </c:pt>
-              </c:strCache>
-            </c:strRef>
-          </c:tx>
-          <c:spPr>
-            <a:ln w="28575" cap="rnd">
-              <a:solidFill>
-                <a:schemeClr val="accent3"/>
-              </a:solidFill>
-              <a:round/>
-            </a:ln>
-            <a:effectLst/>
-          </c:spPr>
-          <c:marker>
-            <c:symbol val="none"/>
-          </c:marker>
-          <c:dLbls>
-            <c:dLbl>
-              <c:idx val="3"/>
-              <c:dLblPos val="r"/>
-              <c:showLegendKey val="0"/>
-              <c:showVal val="1"/>
-              <c:showCatName val="0"/>
-              <c:showSerName val="1"/>
-              <c:showPercent val="0"/>
-              <c:showBubbleSize val="0"/>
-              <c:extLst>
-                <c:ext xmlns:c15="http://schemas.microsoft.com/office/drawing/2012/chart" uri="{CE6537A1-D6FC-4f65-9D91-7224C49458BB}"/>
-                <c:ext xmlns:c16="http://schemas.microsoft.com/office/drawing/2014/chart" uri="{C3380CC4-5D6E-409C-BE32-E72D297353CC}">
-                  <c16:uniqueId val="{00000004-4363-455B-8FCB-A6D9C29762D6}"/>
-                </c:ext>
-              </c:extLst>
-            </c:dLbl>
-            <c:spPr>
-              <a:noFill/>
-              <a:ln>
-                <a:noFill/>
-              </a:ln>
-              <a:effectLst/>
-            </c:spPr>
-            <c:txPr>
-              <a:bodyPr rot="0" spcFirstLastPara="1" vertOverflow="ellipsis" vert="horz" wrap="square" lIns="38100" tIns="19050" rIns="38100" bIns="19050" anchor="ctr" anchorCtr="1">
-                <a:spAutoFit/>
-              </a:bodyPr>
-              <a:lstStyle/>
-              <a:p>
-                <a:pPr>
-                  <a:defRPr sz="1197" b="0" i="0" u="none" strike="noStrike" kern="1200" baseline="0">
-                    <a:solidFill>
-                      <a:schemeClr val="tx1">
-                        <a:lumMod val="75000"/>
-                        <a:lumOff val="25000"/>
-                      </a:schemeClr>
-                    </a:solidFill>
-                    <a:latin typeface="+mn-lt"/>
-                    <a:ea typeface="+mn-ea"/>
-                    <a:cs typeface="+mn-cs"/>
-                  </a:defRPr>
-                </a:pPr>
-                <a:endParaRPr lang="en-US"/>
-              </a:p>
-            </c:txPr>
-            <c:showLegendKey val="0"/>
-            <c:showVal val="0"/>
-            <c:showCatName val="0"/>
-            <c:showSerName val="0"/>
-            <c:showPercent val="0"/>
-            <c:showBubbleSize val="0"/>
-            <c:extLst>
-              <c:ext xmlns:c15="http://schemas.microsoft.com/office/drawing/2012/chart" uri="{CE6537A1-D6FC-4f65-9D91-7224C49458BB}">
-                <c15:showLeaderLines val="1"/>
-                <c15:leaderLines>
-                  <c:spPr>
-                    <a:ln w="9525" cap="flat" cmpd="sng" algn="ctr">
-                      <a:solidFill>
-                        <a:schemeClr val="tx1">
-                          <a:lumMod val="35000"/>
-                          <a:lumOff val="65000"/>
-                        </a:schemeClr>
-                      </a:solidFill>
-                      <a:round/>
-                    </a:ln>
-                    <a:effectLst/>
-                  </c:spPr>
-                </c15:leaderLines>
-              </c:ext>
-            </c:extLst>
-          </c:dLbls>
-          <c:cat>
-            <c:strRef>
-              <c:f>Sheet1!$A$2:$A$5</c:f>
-              <c:strCache>
-                <c:ptCount val="4"/>
-                <c:pt idx="0">
-                  <c:v>Category 1</c:v>
-                </c:pt>
-                <c:pt idx="1">
-                  <c:v>Category 2</c:v>
-                </c:pt>
-                <c:pt idx="2">
-                  <c:v>Category 3</c:v>
-                </c:pt>
-                <c:pt idx="3">
-                  <c:v>Category 4</c:v>
-                </c:pt>
-              </c:strCache>
-            </c:strRef>
-          </c:cat>
-          <c:val>
-            <c:numRef>
-              <c:f>Sheet1!$D$2:$D$5</c:f>
-              <c:numCache>
-                <c:formatCode>General</c:formatCode>
-                <c:ptCount val="4"/>
-                <c:pt idx="0">
-                  <c:v>2</c:v>
-                </c:pt>
-                <c:pt idx="1">
-                  <c:v>2</c:v>
-                </c:pt>
-                <c:pt idx="2">
-                  <c:v>3</c:v>
-                </c:pt>
-                <c:pt idx="3">
-                  <c:v>5</c:v>
-                </c:pt>
-              </c:numCache>
-            </c:numRef>
-          </c:val>
-          <c:smooth val="0"/>
-          <c:extLst>
-            <c:ext xmlns:c16="http://schemas.microsoft.com/office/drawing/2014/chart" uri="{C3380CC4-5D6E-409C-BE32-E72D297353CC}">
-              <c16:uniqueId val="{00000005-4363-455B-8FCB-A6D9C29762D6}"/>
-            </c:ext>
-          </c:extLst>
-        </c:ser>
-        <c:dLbls>
-          <c:showLegendKey val="0"/>
-          <c:showVal val="0"/>
-          <c:showCatName val="0"/>
-          <c:showSerName val="0"/>
-          <c:showPercent val="0"/>
-          <c:showBubbleSize val="0"/>
-        </c:dLbls>
-        <c:smooth val="0"/>
-        <c:axId val="128015744"/>
-        <c:axId val="128021632"/>
-      </c:lineChart>
-      <c:catAx>
-        <c:axId val="128015744"/>
-        <c:scaling>
-          <c:orientation val="minMax"/>
-        </c:scaling>
-        <c:delete val="0"/>
-        <c:axPos val="b"/>
-        <c:numFmt formatCode="General" sourceLinked="1"/>
-        <c:majorTickMark val="none"/>
-        <c:minorTickMark val="none"/>
-        <c:tickLblPos val="nextTo"/>
-        <c:spPr>
-          <a:noFill/>
-          <a:ln w="9525" cap="flat" cmpd="sng" algn="ctr">
-            <a:solidFill>
-              <a:schemeClr val="tx1">
-                <a:lumMod val="15000"/>
-                <a:lumOff val="85000"/>
-              </a:schemeClr>
-            </a:solidFill>
-            <a:round/>
-          </a:ln>
-          <a:effectLst/>
-        </c:spPr>
-        <c:txPr>
-          <a:bodyPr rot="-60000000" spcFirstLastPara="1" vertOverflow="ellipsis" vert="horz" wrap="square" anchor="ctr" anchorCtr="1"/>
-          <a:lstStyle/>
-          <a:p>
-            <a:pPr>
-              <a:defRPr sz="1197" b="0" i="0" u="none" strike="noStrike" kern="1200" baseline="0">
-                <a:solidFill>
-                  <a:schemeClr val="tx1">
-                    <a:lumMod val="65000"/>
-                    <a:lumOff val="35000"/>
-                  </a:schemeClr>
-                </a:solidFill>
-                <a:latin typeface="+mn-lt"/>
-                <a:ea typeface="+mn-ea"/>
-                <a:cs typeface="+mn-cs"/>
-              </a:defRPr>
-            </a:pPr>
-            <a:endParaRPr lang="en-US"/>
-          </a:p>
-        </c:txPr>
-        <c:crossAx val="128021632"/>
-        <c:crosses val="autoZero"/>
-        <c:auto val="1"/>
-        <c:lblAlgn val="ctr"/>
-        <c:lblOffset val="100"/>
-        <c:noMultiLvlLbl val="0"/>
-      </c:catAx>
-      <c:valAx>
-        <c:axId val="128021632"/>
-        <c:scaling>
-          <c:orientation val="minMax"/>
-        </c:scaling>
-        <c:delete val="0"/>
-        <c:axPos val="l"/>
-        <c:majorGridlines>
-          <c:spPr>
-            <a:ln w="9525" cap="flat" cmpd="sng" algn="ctr">
-              <a:solidFill>
-                <a:schemeClr val="tx1">
-                  <a:lumMod val="15000"/>
-                  <a:lumOff val="85000"/>
-                </a:schemeClr>
-              </a:solidFill>
-              <a:round/>
-            </a:ln>
-            <a:effectLst/>
-          </c:spPr>
-        </c:majorGridlines>
-        <c:title>
-          <c:overlay val="0"/>
-          <c:spPr>
-            <a:noFill/>
-            <a:ln>
-              <a:noFill/>
-            </a:ln>
-            <a:effectLst/>
-          </c:spPr>
-          <c:txPr>
-            <a:bodyPr rot="-5400000" spcFirstLastPara="1" vertOverflow="ellipsis" vert="horz" wrap="square" anchor="ctr" anchorCtr="1"/>
-            <a:lstStyle/>
-            <a:p>
-              <a:pPr>
-                <a:defRPr sz="1330" b="0" i="0" u="none" strike="noStrike" kern="1200" baseline="0">
-                  <a:solidFill>
-                    <a:schemeClr val="tx1">
-                      <a:lumMod val="65000"/>
-                      <a:lumOff val="35000"/>
-                    </a:schemeClr>
-                  </a:solidFill>
-                  <a:latin typeface="+mn-lt"/>
-                  <a:ea typeface="+mn-ea"/>
-                  <a:cs typeface="+mn-cs"/>
-                </a:defRPr>
-              </a:pPr>
-              <a:endParaRPr lang="en-US"/>
-            </a:p>
-          </c:txPr>
-        </c:title>
-        <c:numFmt formatCode="General" sourceLinked="1"/>
-        <c:majorTickMark val="none"/>
-        <c:minorTickMark val="none"/>
-        <c:tickLblPos val="nextTo"/>
-        <c:spPr>
-          <a:noFill/>
-          <a:ln>
-            <a:noFill/>
-          </a:ln>
-          <a:effectLst/>
-        </c:spPr>
-        <c:txPr>
-          <a:bodyPr rot="-60000000" spcFirstLastPara="1" vertOverflow="ellipsis" vert="horz" wrap="square" anchor="ctr" anchorCtr="1"/>
-          <a:lstStyle/>
-          <a:p>
-            <a:pPr>
-              <a:defRPr sz="1197" b="0" i="0" u="none" strike="noStrike" kern="1200" baseline="0">
-                <a:solidFill>
-                  <a:schemeClr val="tx1">
-                    <a:lumMod val="65000"/>
-                    <a:lumOff val="35000"/>
-                  </a:schemeClr>
-                </a:solidFill>
-                <a:latin typeface="+mn-lt"/>
-                <a:ea typeface="+mn-ea"/>
-                <a:cs typeface="+mn-cs"/>
-              </a:defRPr>
-            </a:pPr>
-            <a:endParaRPr lang="en-US"/>
-          </a:p>
-        </c:txPr>
-        <c:crossAx val="128015744"/>
-        <c:crosses val="autoZero"/>
-        <c:crossBetween val="between"/>
-      </c:valAx>
-      <c:spPr>
-        <a:noFill/>
-        <a:ln>
-          <a:noFill/>
-        </a:ln>
-        <a:effectLst/>
-      </c:spPr>
-    </c:plotArea>
-    <c:plotVisOnly val="1"/>
-    <c:dispBlanksAs val="gap"/>
-    <c:showDLblsOverMax val="0"/>
-  </c:chart>
-  <c:spPr>
-    <a:noFill/>
-    <a:ln>
-      <a:noFill/>
-    </a:ln>
-    <a:effectLst/>
-  </c:spPr>
-  <c:txPr>
-    <a:bodyPr/>
-    <a:lstStyle/>
-    <a:p>
-      <a:pPr>
-        <a:defRPr/>
-      </a:pPr>
-      <a:endParaRPr lang="en-US"/>
-    </a:p>
-  </c:txPr>
-  <c:externalData r:id="rId3">
-    <c:autoUpdate val="0"/>
-  </c:externalData>
-</c:chartSpace>
-</file>
-
 <file path=ppt/charts/colors1.xml><?xml version="1.0" encoding="utf-8"?>
 <cs:colorStyle xmlns:cs="http://schemas.microsoft.com/office/drawing/2012/chartStyle" xmlns:a="http://schemas.openxmlformats.org/drawingml/2006/main" meth="cycle" id="10">
   <a:schemeClr val="accent1"/>
@@ -1516,563 +844,7 @@
 </cs:colorStyle>
 </file>
 
-<file path=ppt/charts/colors2.xml><?xml version="1.0" encoding="utf-8"?>
-<cs:colorStyle xmlns:cs="http://schemas.microsoft.com/office/drawing/2012/chartStyle" xmlns:a="http://schemas.openxmlformats.org/drawingml/2006/main" meth="cycle" id="10">
-  <a:schemeClr val="accent1"/>
-  <a:schemeClr val="accent2"/>
-  <a:schemeClr val="accent3"/>
-  <a:schemeClr val="accent4"/>
-  <a:schemeClr val="accent5"/>
-  <a:schemeClr val="accent6"/>
-  <cs:variation/>
-  <cs:variation>
-    <a:lumMod val="60000"/>
-  </cs:variation>
-  <cs:variation>
-    <a:lumMod val="80000"/>
-    <a:lumOff val="20000"/>
-  </cs:variation>
-  <cs:variation>
-    <a:lumMod val="80000"/>
-  </cs:variation>
-  <cs:variation>
-    <a:lumMod val="60000"/>
-    <a:lumOff val="40000"/>
-  </cs:variation>
-  <cs:variation>
-    <a:lumMod val="50000"/>
-  </cs:variation>
-  <cs:variation>
-    <a:lumMod val="70000"/>
-    <a:lumOff val="30000"/>
-  </cs:variation>
-  <cs:variation>
-    <a:lumMod val="70000"/>
-  </cs:variation>
-  <cs:variation>
-    <a:lumMod val="50000"/>
-    <a:lumOff val="50000"/>
-  </cs:variation>
-</cs:colorStyle>
-</file>
-
 <file path=ppt/charts/style1.xml><?xml version="1.0" encoding="utf-8"?>
-<cs:chartStyle xmlns:cs="http://schemas.microsoft.com/office/drawing/2012/chartStyle" xmlns:a="http://schemas.openxmlformats.org/drawingml/2006/main" id="227">
-  <cs:axisTitle>
-    <cs:lnRef idx="0"/>
-    <cs:fillRef idx="0"/>
-    <cs:effectRef idx="0"/>
-    <cs:fontRef idx="minor">
-      <a:schemeClr val="tx1">
-        <a:lumMod val="65000"/>
-        <a:lumOff val="35000"/>
-      </a:schemeClr>
-    </cs:fontRef>
-    <cs:defRPr sz="1330" kern="1200"/>
-  </cs:axisTitle>
-  <cs:categoryAxis>
-    <cs:lnRef idx="0"/>
-    <cs:fillRef idx="0"/>
-    <cs:effectRef idx="0"/>
-    <cs:fontRef idx="minor">
-      <a:schemeClr val="tx1">
-        <a:lumMod val="65000"/>
-        <a:lumOff val="35000"/>
-      </a:schemeClr>
-    </cs:fontRef>
-    <cs:spPr>
-      <a:ln w="9525" cap="flat" cmpd="sng" algn="ctr">
-        <a:solidFill>
-          <a:schemeClr val="tx1">
-            <a:lumMod val="15000"/>
-            <a:lumOff val="85000"/>
-          </a:schemeClr>
-        </a:solidFill>
-        <a:round/>
-      </a:ln>
-    </cs:spPr>
-    <cs:defRPr sz="1197" kern="1200"/>
-  </cs:categoryAxis>
-  <cs:chartArea mods="allowNoFillOverride allowNoLineOverride">
-    <cs:lnRef idx="0"/>
-    <cs:fillRef idx="0"/>
-    <cs:effectRef idx="0"/>
-    <cs:fontRef idx="minor">
-      <a:schemeClr val="tx1"/>
-    </cs:fontRef>
-    <cs:spPr>
-      <a:solidFill>
-        <a:schemeClr val="bg1"/>
-      </a:solidFill>
-      <a:ln w="9525" cap="flat" cmpd="sng" algn="ctr">
-        <a:solidFill>
-          <a:schemeClr val="tx1">
-            <a:lumMod val="15000"/>
-            <a:lumOff val="85000"/>
-          </a:schemeClr>
-        </a:solidFill>
-        <a:round/>
-      </a:ln>
-    </cs:spPr>
-    <cs:defRPr sz="1330" kern="1200"/>
-  </cs:chartArea>
-  <cs:dataLabel>
-    <cs:lnRef idx="0"/>
-    <cs:fillRef idx="0"/>
-    <cs:effectRef idx="0"/>
-    <cs:fontRef idx="minor">
-      <a:schemeClr val="tx1">
-        <a:lumMod val="75000"/>
-        <a:lumOff val="25000"/>
-      </a:schemeClr>
-    </cs:fontRef>
-    <cs:defRPr sz="1197" kern="1200"/>
-  </cs:dataLabel>
-  <cs:dataLabelCallout>
-    <cs:lnRef idx="0"/>
-    <cs:fillRef idx="0"/>
-    <cs:effectRef idx="0"/>
-    <cs:fontRef idx="minor">
-      <a:schemeClr val="dk1">
-        <a:lumMod val="65000"/>
-        <a:lumOff val="35000"/>
-      </a:schemeClr>
-    </cs:fontRef>
-    <cs:spPr>
-      <a:solidFill>
-        <a:schemeClr val="lt1"/>
-      </a:solidFill>
-      <a:ln>
-        <a:solidFill>
-          <a:schemeClr val="dk1">
-            <a:lumMod val="25000"/>
-            <a:lumOff val="75000"/>
-          </a:schemeClr>
-        </a:solidFill>
-      </a:ln>
-    </cs:spPr>
-    <cs:defRPr sz="1197" kern="1200"/>
-    <cs:bodyPr rot="0" spcFirstLastPara="1" vertOverflow="clip" horzOverflow="clip" vert="horz" wrap="square" lIns="36576" tIns="18288" rIns="36576" bIns="18288" anchor="ctr" anchorCtr="1">
-      <a:spAutoFit/>
-    </cs:bodyPr>
-  </cs:dataLabelCallout>
-  <cs:dataPoint>
-    <cs:lnRef idx="0"/>
-    <cs:fillRef idx="1">
-      <cs:styleClr val="auto"/>
-    </cs:fillRef>
-    <cs:effectRef idx="0"/>
-    <cs:fontRef idx="minor">
-      <a:schemeClr val="tx1"/>
-    </cs:fontRef>
-    <cs:spPr>
-      <a:solidFill>
-        <a:schemeClr val="phClr"/>
-      </a:solidFill>
-    </cs:spPr>
-  </cs:dataPoint>
-  <cs:dataPoint3D>
-    <cs:lnRef idx="0"/>
-    <cs:fillRef idx="1">
-      <cs:styleClr val="auto"/>
-    </cs:fillRef>
-    <cs:effectRef idx="0"/>
-    <cs:fontRef idx="minor">
-      <a:schemeClr val="tx1"/>
-    </cs:fontRef>
-    <cs:spPr>
-      <a:solidFill>
-        <a:schemeClr val="phClr"/>
-      </a:solidFill>
-    </cs:spPr>
-  </cs:dataPoint3D>
-  <cs:dataPointLine>
-    <cs:lnRef idx="0">
-      <cs:styleClr val="auto"/>
-    </cs:lnRef>
-    <cs:fillRef idx="1"/>
-    <cs:effectRef idx="0"/>
-    <cs:fontRef idx="minor">
-      <a:schemeClr val="tx1"/>
-    </cs:fontRef>
-    <cs:spPr>
-      <a:ln w="28575" cap="rnd">
-        <a:solidFill>
-          <a:schemeClr val="phClr"/>
-        </a:solidFill>
-        <a:round/>
-      </a:ln>
-    </cs:spPr>
-  </cs:dataPointLine>
-  <cs:dataPointMarker>
-    <cs:lnRef idx="0">
-      <cs:styleClr val="auto"/>
-    </cs:lnRef>
-    <cs:fillRef idx="1">
-      <cs:styleClr val="auto"/>
-    </cs:fillRef>
-    <cs:effectRef idx="0"/>
-    <cs:fontRef idx="minor">
-      <a:schemeClr val="tx1"/>
-    </cs:fontRef>
-    <cs:spPr>
-      <a:solidFill>
-        <a:schemeClr val="phClr"/>
-      </a:solidFill>
-      <a:ln w="9525">
-        <a:solidFill>
-          <a:schemeClr val="phClr"/>
-        </a:solidFill>
-      </a:ln>
-    </cs:spPr>
-  </cs:dataPointMarker>
-  <cs:dataPointMarkerLayout symbol="circle" size="5"/>
-  <cs:dataPointWireframe>
-    <cs:lnRef idx="0">
-      <cs:styleClr val="auto"/>
-    </cs:lnRef>
-    <cs:fillRef idx="1"/>
-    <cs:effectRef idx="0"/>
-    <cs:fontRef idx="minor">
-      <a:schemeClr val="tx1"/>
-    </cs:fontRef>
-    <cs:spPr>
-      <a:ln w="9525" cap="rnd">
-        <a:solidFill>
-          <a:schemeClr val="phClr"/>
-        </a:solidFill>
-        <a:round/>
-      </a:ln>
-    </cs:spPr>
-  </cs:dataPointWireframe>
-  <cs:dataTable>
-    <cs:lnRef idx="0"/>
-    <cs:fillRef idx="0"/>
-    <cs:effectRef idx="0"/>
-    <cs:fontRef idx="minor">
-      <a:schemeClr val="tx1">
-        <a:lumMod val="65000"/>
-        <a:lumOff val="35000"/>
-      </a:schemeClr>
-    </cs:fontRef>
-    <cs:spPr>
-      <a:noFill/>
-      <a:ln w="9525" cap="flat" cmpd="sng" algn="ctr">
-        <a:solidFill>
-          <a:schemeClr val="tx1">
-            <a:lumMod val="15000"/>
-            <a:lumOff val="85000"/>
-          </a:schemeClr>
-        </a:solidFill>
-        <a:round/>
-      </a:ln>
-    </cs:spPr>
-    <cs:defRPr sz="1197" kern="1200"/>
-  </cs:dataTable>
-  <cs:downBar>
-    <cs:lnRef idx="0"/>
-    <cs:fillRef idx="0"/>
-    <cs:effectRef idx="0"/>
-    <cs:fontRef idx="minor">
-      <a:schemeClr val="dk1"/>
-    </cs:fontRef>
-    <cs:spPr>
-      <a:solidFill>
-        <a:schemeClr val="dk1">
-          <a:lumMod val="65000"/>
-          <a:lumOff val="35000"/>
-        </a:schemeClr>
-      </a:solidFill>
-      <a:ln w="9525">
-        <a:solidFill>
-          <a:schemeClr val="tx1">
-            <a:lumMod val="65000"/>
-            <a:lumOff val="35000"/>
-          </a:schemeClr>
-        </a:solidFill>
-      </a:ln>
-    </cs:spPr>
-  </cs:downBar>
-  <cs:dropLine>
-    <cs:lnRef idx="0"/>
-    <cs:fillRef idx="0"/>
-    <cs:effectRef idx="0"/>
-    <cs:fontRef idx="minor">
-      <a:schemeClr val="tx1"/>
-    </cs:fontRef>
-    <cs:spPr>
-      <a:ln w="9525" cap="flat" cmpd="sng" algn="ctr">
-        <a:solidFill>
-          <a:schemeClr val="tx1">
-            <a:lumMod val="35000"/>
-            <a:lumOff val="65000"/>
-          </a:schemeClr>
-        </a:solidFill>
-        <a:round/>
-      </a:ln>
-    </cs:spPr>
-  </cs:dropLine>
-  <cs:errorBar>
-    <cs:lnRef idx="0"/>
-    <cs:fillRef idx="0"/>
-    <cs:effectRef idx="0"/>
-    <cs:fontRef idx="minor">
-      <a:schemeClr val="tx1"/>
-    </cs:fontRef>
-    <cs:spPr>
-      <a:ln w="9525" cap="flat" cmpd="sng" algn="ctr">
-        <a:solidFill>
-          <a:schemeClr val="tx1">
-            <a:lumMod val="65000"/>
-            <a:lumOff val="35000"/>
-          </a:schemeClr>
-        </a:solidFill>
-        <a:round/>
-      </a:ln>
-    </cs:spPr>
-  </cs:errorBar>
-  <cs:floor>
-    <cs:lnRef idx="0"/>
-    <cs:fillRef idx="0"/>
-    <cs:effectRef idx="0"/>
-    <cs:fontRef idx="minor">
-      <a:schemeClr val="tx1"/>
-    </cs:fontRef>
-    <cs:spPr>
-      <a:noFill/>
-      <a:ln>
-        <a:noFill/>
-      </a:ln>
-    </cs:spPr>
-  </cs:floor>
-  <cs:gridlineMajor>
-    <cs:lnRef idx="0"/>
-    <cs:fillRef idx="0"/>
-    <cs:effectRef idx="0"/>
-    <cs:fontRef idx="minor">
-      <a:schemeClr val="tx1"/>
-    </cs:fontRef>
-    <cs:spPr>
-      <a:ln w="9525" cap="flat" cmpd="sng" algn="ctr">
-        <a:solidFill>
-          <a:schemeClr val="tx1">
-            <a:lumMod val="15000"/>
-            <a:lumOff val="85000"/>
-          </a:schemeClr>
-        </a:solidFill>
-        <a:round/>
-      </a:ln>
-    </cs:spPr>
-  </cs:gridlineMajor>
-  <cs:gridlineMinor>
-    <cs:lnRef idx="0"/>
-    <cs:fillRef idx="0"/>
-    <cs:effectRef idx="0"/>
-    <cs:fontRef idx="minor">
-      <a:schemeClr val="tx1"/>
-    </cs:fontRef>
-    <cs:spPr>
-      <a:ln w="9525" cap="flat" cmpd="sng" algn="ctr">
-        <a:solidFill>
-          <a:schemeClr val="tx1">
-            <a:lumMod val="5000"/>
-            <a:lumOff val="95000"/>
-          </a:schemeClr>
-        </a:solidFill>
-        <a:round/>
-      </a:ln>
-    </cs:spPr>
-  </cs:gridlineMinor>
-  <cs:hiLoLine>
-    <cs:lnRef idx="0"/>
-    <cs:fillRef idx="0"/>
-    <cs:effectRef idx="0"/>
-    <cs:fontRef idx="minor">
-      <a:schemeClr val="tx1"/>
-    </cs:fontRef>
-    <cs:spPr>
-      <a:ln w="9525" cap="flat" cmpd="sng" algn="ctr">
-        <a:solidFill>
-          <a:schemeClr val="tx1">
-            <a:lumMod val="75000"/>
-            <a:lumOff val="25000"/>
-          </a:schemeClr>
-        </a:solidFill>
-        <a:round/>
-      </a:ln>
-    </cs:spPr>
-  </cs:hiLoLine>
-  <cs:leaderLine>
-    <cs:lnRef idx="0"/>
-    <cs:fillRef idx="0"/>
-    <cs:effectRef idx="0"/>
-    <cs:fontRef idx="minor">
-      <a:schemeClr val="tx1"/>
-    </cs:fontRef>
-    <cs:spPr>
-      <a:ln w="9525" cap="flat" cmpd="sng" algn="ctr">
-        <a:solidFill>
-          <a:schemeClr val="tx1">
-            <a:lumMod val="35000"/>
-            <a:lumOff val="65000"/>
-          </a:schemeClr>
-        </a:solidFill>
-        <a:round/>
-      </a:ln>
-    </cs:spPr>
-  </cs:leaderLine>
-  <cs:legend>
-    <cs:lnRef idx="0"/>
-    <cs:fillRef idx="0"/>
-    <cs:effectRef idx="0"/>
-    <cs:fontRef idx="minor">
-      <a:schemeClr val="tx1">
-        <a:lumMod val="65000"/>
-        <a:lumOff val="35000"/>
-      </a:schemeClr>
-    </cs:fontRef>
-    <cs:defRPr sz="1197" kern="1200"/>
-  </cs:legend>
-  <cs:plotArea mods="allowNoFillOverride allowNoLineOverride">
-    <cs:lnRef idx="0"/>
-    <cs:fillRef idx="0"/>
-    <cs:effectRef idx="0"/>
-    <cs:fontRef idx="minor">
-      <a:schemeClr val="tx1"/>
-    </cs:fontRef>
-  </cs:plotArea>
-  <cs:plotArea3D mods="allowNoFillOverride allowNoLineOverride">
-    <cs:lnRef idx="0"/>
-    <cs:fillRef idx="0"/>
-    <cs:effectRef idx="0"/>
-    <cs:fontRef idx="minor">
-      <a:schemeClr val="tx1"/>
-    </cs:fontRef>
-  </cs:plotArea3D>
-  <cs:seriesAxis>
-    <cs:lnRef idx="0"/>
-    <cs:fillRef idx="0"/>
-    <cs:effectRef idx="0"/>
-    <cs:fontRef idx="minor">
-      <a:schemeClr val="tx1">
-        <a:lumMod val="65000"/>
-        <a:lumOff val="35000"/>
-      </a:schemeClr>
-    </cs:fontRef>
-    <cs:defRPr sz="1197" kern="1200"/>
-  </cs:seriesAxis>
-  <cs:seriesLine>
-    <cs:lnRef idx="0"/>
-    <cs:fillRef idx="0"/>
-    <cs:effectRef idx="0"/>
-    <cs:fontRef idx="minor">
-      <a:schemeClr val="tx1"/>
-    </cs:fontRef>
-    <cs:spPr>
-      <a:ln w="9525" cap="flat" cmpd="sng" algn="ctr">
-        <a:solidFill>
-          <a:schemeClr val="tx1">
-            <a:lumMod val="35000"/>
-            <a:lumOff val="65000"/>
-          </a:schemeClr>
-        </a:solidFill>
-        <a:round/>
-      </a:ln>
-    </cs:spPr>
-  </cs:seriesLine>
-  <cs:title>
-    <cs:lnRef idx="0"/>
-    <cs:fillRef idx="0"/>
-    <cs:effectRef idx="0"/>
-    <cs:fontRef idx="minor">
-      <a:schemeClr val="tx1">
-        <a:lumMod val="65000"/>
-        <a:lumOff val="35000"/>
-      </a:schemeClr>
-    </cs:fontRef>
-    <cs:defRPr sz="1862" b="0" kern="1200" spc="0" baseline="0"/>
-  </cs:title>
-  <cs:trendline>
-    <cs:lnRef idx="0">
-      <cs:styleClr val="auto"/>
-    </cs:lnRef>
-    <cs:fillRef idx="0"/>
-    <cs:effectRef idx="0"/>
-    <cs:fontRef idx="minor">
-      <a:schemeClr val="tx1"/>
-    </cs:fontRef>
-    <cs:spPr>
-      <a:ln w="19050" cap="rnd">
-        <a:solidFill>
-          <a:schemeClr val="phClr"/>
-        </a:solidFill>
-        <a:prstDash val="sysDot"/>
-      </a:ln>
-    </cs:spPr>
-  </cs:trendline>
-  <cs:trendlineLabel>
-    <cs:lnRef idx="0"/>
-    <cs:fillRef idx="0"/>
-    <cs:effectRef idx="0"/>
-    <cs:fontRef idx="minor">
-      <a:schemeClr val="tx1">
-        <a:lumMod val="65000"/>
-        <a:lumOff val="35000"/>
-      </a:schemeClr>
-    </cs:fontRef>
-    <cs:defRPr sz="1197" kern="1200"/>
-  </cs:trendlineLabel>
-  <cs:upBar>
-    <cs:lnRef idx="0"/>
-    <cs:fillRef idx="0"/>
-    <cs:effectRef idx="0"/>
-    <cs:fontRef idx="minor">
-      <a:schemeClr val="dk1"/>
-    </cs:fontRef>
-    <cs:spPr>
-      <a:solidFill>
-        <a:schemeClr val="lt1"/>
-      </a:solidFill>
-      <a:ln w="9525">
-        <a:solidFill>
-          <a:schemeClr val="tx1">
-            <a:lumMod val="15000"/>
-            <a:lumOff val="85000"/>
-          </a:schemeClr>
-        </a:solidFill>
-      </a:ln>
-    </cs:spPr>
-  </cs:upBar>
-  <cs:valueAxis>
-    <cs:lnRef idx="0"/>
-    <cs:fillRef idx="0"/>
-    <cs:effectRef idx="0"/>
-    <cs:fontRef idx="minor">
-      <a:schemeClr val="tx1">
-        <a:lumMod val="65000"/>
-        <a:lumOff val="35000"/>
-      </a:schemeClr>
-    </cs:fontRef>
-    <cs:defRPr sz="1197" kern="1200"/>
-  </cs:valueAxis>
-  <cs:wall>
-    <cs:lnRef idx="0"/>
-    <cs:fillRef idx="0"/>
-    <cs:effectRef idx="0"/>
-    <cs:fontRef idx="minor">
-      <a:schemeClr val="tx1"/>
-    </cs:fontRef>
-    <cs:spPr>
-      <a:noFill/>
-      <a:ln>
-        <a:noFill/>
-      </a:ln>
-    </cs:spPr>
-  </cs:wall>
-</cs:chartStyle>
-</file>
-
-<file path=ppt/charts/style2.xml><?xml version="1.0" encoding="utf-8"?>
 <cs:chartStyle xmlns:cs="http://schemas.microsoft.com/office/drawing/2012/chartStyle" xmlns:a="http://schemas.openxmlformats.org/drawingml/2006/main" id="227">
   <cs:axisTitle>
     <cs:lnRef idx="0"/>
@@ -3156,61 +1928,6 @@
                 <a:spcPts val="1200"/>
               </a:spcBef>
             </a:pPr>
-            <a:r>
-              <a:rPr lang="en-US" dirty="0">
-                <a:solidFill>
-                  <a:prstClr val="white">
-                    <a:lumMod val="50000"/>
-                  </a:prstClr>
-                </a:solidFill>
-                <a:cs typeface="Calibri" panose="020F0502020204030204" pitchFamily="34" charset="0"/>
-              </a:rPr>
-              <a:t>To change this poster, replace our </a:t>
-            </a:r>
-            <a:r>
-              <a:rPr lang="en-US" baseline="0" dirty="0">
-                <a:solidFill>
-                  <a:prstClr val="white">
-                    <a:lumMod val="50000"/>
-                  </a:prstClr>
-                </a:solidFill>
-                <a:cs typeface="Calibri" panose="020F0502020204030204" pitchFamily="34" charset="0"/>
-              </a:rPr>
-              <a:t>sample content with your own</a:t>
-            </a:r>
-            <a:r>
-              <a:rPr lang="en-US" dirty="0">
-                <a:solidFill>
-                  <a:prstClr val="white">
-                    <a:lumMod val="50000"/>
-                  </a:prstClr>
-                </a:solidFill>
-                <a:cs typeface="Calibri" panose="020F0502020204030204" pitchFamily="34" charset="0"/>
-              </a:rPr>
-              <a:t>. Or, if you'd rather start</a:t>
-            </a:r>
-            <a:r>
-              <a:rPr lang="en-US" baseline="0" dirty="0">
-                <a:solidFill>
-                  <a:prstClr val="white">
-                    <a:lumMod val="50000"/>
-                  </a:prstClr>
-                </a:solidFill>
-                <a:cs typeface="Calibri" panose="020F0502020204030204" pitchFamily="34" charset="0"/>
-              </a:rPr>
-              <a:t> from a clean slate, use the New Slide button on the Home tab to insert a new page, then enter your text and content in the empty placeholders.</a:t>
-            </a:r>
-            <a:r>
-              <a:rPr lang="en-US" dirty="0">
-                <a:solidFill>
-                  <a:prstClr val="white">
-                    <a:lumMod val="50000"/>
-                  </a:prstClr>
-                </a:solidFill>
-                <a:cs typeface="Calibri" panose="020F0502020204030204" pitchFamily="34" charset="0"/>
-              </a:rPr>
-              <a:t> If you need more placeholders for titles, subtitles or body text, copy any of the existing placeholders, then drag the new one into place. </a:t>
-            </a:r>
             <a:endParaRPr lang="en-US" sz="1200" dirty="0">
               <a:solidFill>
                 <a:prstClr val="white">
@@ -6303,7 +5020,7 @@
           <a:p>
             <a:r>
               <a:rPr lang="en-US" dirty="0"/>
-              <a:t>MOTIVATION, PROBLEM, SOLUTION</a:t>
+              <a:t>MOTIVATION, PROBLEM and SOLUTION</a:t>
             </a:r>
           </a:p>
         </p:txBody>
@@ -6320,13 +5037,13 @@
         </p:nvSpPr>
         <p:spPr>
           <a:xfrm>
-            <a:off x="857250" y="4714240"/>
-            <a:ext cx="9601200" cy="7133844"/>
+            <a:off x="857250" y="4714239"/>
+            <a:ext cx="9601200" cy="6614189"/>
           </a:xfrm>
         </p:spPr>
         <p:txBody>
           <a:bodyPr>
-            <a:normAutofit/>
+            <a:noAutofit/>
           </a:bodyPr>
           <a:lstStyle/>
           <a:p>
@@ -6337,20 +5054,25 @@
               <a:rPr lang="en-US" sz="2400" b="1" dirty="0">
                 <a:latin typeface="Constantia" panose="02030602050306030303" pitchFamily="18" charset="0"/>
               </a:rPr>
-              <a:t>MOTIVATION: </a:t>
-            </a:r>
+              <a:t>MOTIVATION</a:t>
+            </a:r>
+          </a:p>
+          <a:p>
+            <a:pPr marL="0" indent="0" algn="just">
+              <a:buNone/>
+            </a:pPr>
             <a:r>
               <a:rPr lang="en-CA" sz="2400" dirty="0">
                 <a:latin typeface="Constantia" panose="02030602050306030303" pitchFamily="18" charset="0"/>
               </a:rPr>
-              <a:t>In bioinformatics, approximate matching is vital to compare and contrast DNA and protein sequences. The length of sequences involved in these applications reach billions. Thus, efficient string matching algorithms are needed to optimize time and cost of resources.</a:t>
+              <a:t>In bioinformatics, DNA sequences are often represented by regular expressions to capture different variations of the same structure. Efficient approximate string matching would allow us to capture more sequences and optimize time and cost of resources.</a:t>
             </a:r>
           </a:p>
           <a:p>
             <a:pPr marL="0" indent="0" algn="just">
               <a:buNone/>
             </a:pPr>
-            <a:endParaRPr lang="en-CA" sz="2400" dirty="0">
+            <a:endParaRPr lang="en-CA" sz="1400" dirty="0">
               <a:latin typeface="Constantia" panose="02030602050306030303" pitchFamily="18" charset="0"/>
             </a:endParaRPr>
           </a:p>
@@ -6362,20 +5084,25 @@
               <a:rPr lang="en-CA" sz="2400" b="1" dirty="0">
                 <a:latin typeface="Constantia" panose="02030602050306030303" pitchFamily="18" charset="0"/>
               </a:rPr>
-              <a:t>PROBLEM: </a:t>
-            </a:r>
+              <a:t>PROBLEM</a:t>
+            </a:r>
+          </a:p>
+          <a:p>
+            <a:pPr marL="0" indent="0" algn="just">
+              <a:buNone/>
+            </a:pPr>
             <a:r>
               <a:rPr lang="en-CA" sz="2400" dirty="0">
                 <a:latin typeface="Constantia" panose="02030602050306030303" pitchFamily="18" charset="0"/>
               </a:rPr>
-              <a:t>This project explores whether an implementation of exact regular expression matching can be replaced with one of approximate matching, where the error value for an exact match request would be set to zero.</a:t>
+              <a:t>Is it viable to replace an implementation of exact regular expression matching with one of approximate matching for added functionality?</a:t>
             </a:r>
           </a:p>
           <a:p>
             <a:pPr marL="0" indent="0" algn="just">
               <a:buNone/>
             </a:pPr>
-            <a:endParaRPr lang="en-CA" sz="2400" dirty="0">
+            <a:endParaRPr lang="en-CA" sz="1400" dirty="0">
               <a:latin typeface="Constantia" panose="02030602050306030303" pitchFamily="18" charset="0"/>
             </a:endParaRPr>
           </a:p>
@@ -6387,13 +5114,29 @@
               <a:rPr lang="en-CA" sz="2400" b="1" dirty="0">
                 <a:latin typeface="Constantia" panose="02030602050306030303" pitchFamily="18" charset="0"/>
               </a:rPr>
-              <a:t>SOLUTION: </a:t>
-            </a:r>
+              <a:t>SOLUTION</a:t>
+            </a:r>
+          </a:p>
+          <a:p>
+            <a:pPr marL="0" indent="0" algn="just">
+              <a:buNone/>
+            </a:pPr>
             <a:r>
               <a:rPr lang="en-CA" sz="2400" dirty="0">
                 <a:latin typeface="Constantia" panose="02030602050306030303" pitchFamily="18" charset="0"/>
               </a:rPr>
-              <a:t>A Python implementation of exact regular expression matching using Thompson’s NFA is compared with that of Myers and Miller's approximate matching algorithm built on Thompson’s construction. Matches between string and regular expressions of various lengths are used for testing. The testing methodology compares the time each algorithm takes for the same samples.</a:t>
+              <a:t>A comparison of the running times of exact matching using Thompson’s NFA to the Myers and Miller's approximate matching construction. </a:t>
+            </a:r>
+          </a:p>
+          <a:p>
+            <a:pPr marL="0" indent="0" algn="just">
+              <a:buNone/>
+            </a:pPr>
+            <a:r>
+              <a:rPr lang="en-CA" sz="2400" dirty="0">
+                <a:latin typeface="Constantia" panose="02030602050306030303" pitchFamily="18" charset="0"/>
+              </a:rPr>
+              <a:t>Performance tests compare the running times for both algorithm using sequences and regular expressions of various length.</a:t>
             </a:r>
             <a:endParaRPr lang="en-US" sz="2400" b="1" dirty="0">
               <a:latin typeface="Constantia" panose="02030602050306030303" pitchFamily="18" charset="0"/>
@@ -6413,7 +5156,7 @@
         </p:nvSpPr>
         <p:spPr>
           <a:xfrm>
-            <a:off x="891540" y="11848084"/>
+            <a:off x="891540" y="11352784"/>
             <a:ext cx="9601200" cy="1319276"/>
           </a:xfrm>
         </p:spPr>
@@ -6446,7 +5189,7 @@
         </p:nvSpPr>
         <p:spPr>
           <a:xfrm>
-            <a:off x="857250" y="13167360"/>
+            <a:off x="876300" y="12691110"/>
             <a:ext cx="9601200" cy="8117840"/>
           </a:xfrm>
         </p:spPr>
@@ -6779,7 +5522,7 @@
           <a:p>
             <a:r>
               <a:rPr lang="en-US" dirty="0"/>
-              <a:t>MYERS and miller’s CONSTRUCTION</a:t>
+              <a:t>MYER’S &amp; miller’s CONSTRUCTION</a:t>
             </a:r>
           </a:p>
         </p:txBody>
@@ -6902,7 +5645,19 @@
               <a:rPr lang="en-US" sz="2400" dirty="0">
                 <a:latin typeface="Constantia" panose="02030602050306030303" pitchFamily="18" charset="0"/>
               </a:rPr>
-              <a:t> after at most k errors</a:t>
+              <a:t> with at most </a:t>
+            </a:r>
+            <a:r>
+              <a:rPr lang="en-US" sz="2400" i="1" dirty="0">
+                <a:latin typeface="Constantia" panose="02030602050306030303" pitchFamily="18" charset="0"/>
+              </a:rPr>
+              <a:t>k</a:t>
+            </a:r>
+            <a:r>
+              <a:rPr lang="en-US" sz="2400" dirty="0">
+                <a:latin typeface="Constantia" panose="02030602050306030303" pitchFamily="18" charset="0"/>
+              </a:rPr>
+              <a:t> errors</a:t>
             </a:r>
           </a:p>
           <a:p>
@@ -6922,7 +5677,7 @@
               <a:rPr lang="en-US" sz="2400" dirty="0">
                 <a:latin typeface="Constantia" panose="02030602050306030303" pitchFamily="18" charset="0"/>
               </a:rPr>
-              <a:t>Construct a Myers and Millers NFA by combining |</a:t>
+              <a:t>Construct a Myer’s and Miller's NFA by combining |</a:t>
             </a:r>
             <a:r>
               <a:rPr lang="en-US" sz="2400" i="1" dirty="0">
@@ -6979,7 +5734,7 @@
               <a:rPr lang="en-US" sz="2400" dirty="0">
                 <a:latin typeface="Constantia" panose="02030602050306030303" pitchFamily="18" charset="0"/>
               </a:rPr>
-              <a:t>, incrementing a counter for each error.</a:t>
+              <a:t>, tallying each error transition.</a:t>
             </a:r>
           </a:p>
           <a:p>
@@ -7205,31 +5960,6 @@
           </a:graphicData>
         </a:graphic>
       </p:graphicFrame>
-      <p:graphicFrame>
-        <p:nvGraphicFramePr>
-          <p:cNvPr id="32" name="Content Placeholder 31" descr="Line chart" title="Chart"/>
-          <p:cNvGraphicFramePr>
-            <a:graphicFrameLocks noGrp="1"/>
-          </p:cNvGraphicFramePr>
-          <p:nvPr>
-            <p:ph sz="quarter" idx="33"/>
-            <p:extLst>
-              <p:ext uri="{D42A27DB-BD31-4B8C-83A1-F6EECF244321}">
-                <p14:modId xmlns:p14="http://schemas.microsoft.com/office/powerpoint/2010/main" val="2054185370"/>
-              </p:ext>
-            </p:extLst>
-          </p:nvPr>
-        </p:nvGraphicFramePr>
-        <p:xfrm>
-          <a:off x="22959060" y="10226687"/>
-          <a:ext cx="8534400" cy="4876800"/>
-        </p:xfrm>
-        <a:graphic>
-          <a:graphicData uri="http://schemas.openxmlformats.org/drawingml/2006/chart">
-            <c:chart xmlns:c="http://schemas.openxmlformats.org/drawingml/2006/chart" xmlns:r="http://schemas.openxmlformats.org/officeDocument/2006/relationships" r:id="rId4"/>
-          </a:graphicData>
-        </a:graphic>
-      </p:graphicFrame>
       <p:sp>
         <p:nvSpPr>
           <p:cNvPr id="21" name="Text Placeholder 20"/>
@@ -7269,22 +5999,21 @@
           <a:lstStyle/>
           <a:p>
             <a:r>
-              <a:rPr lang="en-US"/>
+              <a:rPr lang="en-US" dirty="0"/>
               <a:t>Conclusion 1</a:t>
             </a:r>
           </a:p>
           <a:p>
             <a:r>
-              <a:rPr lang="en-US"/>
+              <a:rPr lang="en-US" dirty="0"/>
               <a:t>Conclusion 2</a:t>
             </a:r>
           </a:p>
           <a:p>
             <a:r>
-              <a:rPr lang="en-US"/>
+              <a:rPr lang="en-US" dirty="0"/>
               <a:t>Conclusion 3</a:t>
             </a:r>
-            <a:endParaRPr lang="en-US" dirty="0"/>
           </a:p>
         </p:txBody>
       </p:sp>
@@ -7303,7 +6032,7 @@
           <p:nvPr/>
         </p:nvPicPr>
         <p:blipFill>
-          <a:blip r:embed="rId5"/>
+          <a:blip r:embed="rId4"/>
           <a:stretch>
             <a:fillRect/>
           </a:stretch>
@@ -7333,7 +6062,7 @@
           <p:nvPr/>
         </p:nvPicPr>
         <p:blipFill>
-          <a:blip r:embed="rId6"/>
+          <a:blip r:embed="rId5"/>
           <a:stretch>
             <a:fillRect/>
           </a:stretch>
@@ -7363,9 +6092,9 @@
         <p:grpSpPr>
           <a:xfrm>
             <a:off x="11658600" y="10682098"/>
-            <a:ext cx="9308317" cy="7351902"/>
+            <a:ext cx="8042330" cy="7306671"/>
             <a:chOff x="12157710" y="8281162"/>
-            <a:chExt cx="9308317" cy="7351902"/>
+            <a:chExt cx="8042330" cy="7306671"/>
           </a:xfrm>
         </p:grpSpPr>
         <p:pic>
@@ -7383,13 +6112,13 @@
             <p:nvPr/>
           </p:nvPicPr>
           <p:blipFill rotWithShape="1">
-            <a:blip r:embed="rId7"/>
+            <a:blip r:embed="rId6"/>
             <a:srcRect l="3069" r="3398" b="4456"/>
             <a:stretch/>
           </p:blipFill>
           <p:spPr>
             <a:xfrm>
-              <a:off x="13304723" y="8927493"/>
+              <a:off x="12797854" y="8882262"/>
               <a:ext cx="7014290" cy="6705571"/>
             </a:xfrm>
             <a:prstGeom prst="rect">
@@ -7412,7 +6141,7 @@
           <p:spPr>
             <a:xfrm>
               <a:off x="12157710" y="8281162"/>
-              <a:ext cx="9308317" cy="646331"/>
+              <a:ext cx="8042330" cy="584775"/>
             </a:xfrm>
             <a:prstGeom prst="rect">
               <a:avLst/>
@@ -7426,22 +6155,46 @@
             <a:lstStyle/>
             <a:p>
               <a:r>
-                <a:rPr lang="en-CA" sz="3600" dirty="0">
+                <a:rPr lang="en-CA" sz="3200" u="sng" dirty="0">
                   <a:latin typeface="Constantia" panose="02030602050306030303" pitchFamily="18" charset="0"/>
                 </a:rPr>
-                <a:t>Myer’s &amp; Miller’s NFA with r = (</a:t>
+                <a:t>Myer’s &amp; Miller’s NFA for </a:t>
               </a:r>
               <a:r>
-                <a:rPr lang="en-CA" sz="3600" dirty="0" err="1">
+                <a:rPr lang="en-CA" sz="3200" i="1" u="sng" dirty="0">
+                  <a:latin typeface="Constantia" panose="02030602050306030303" pitchFamily="18" charset="0"/>
+                </a:rPr>
+                <a:t>r</a:t>
+              </a:r>
+              <a:r>
+                <a:rPr lang="en-CA" sz="3200" u="sng" dirty="0">
+                  <a:latin typeface="Constantia" panose="02030602050306030303" pitchFamily="18" charset="0"/>
+                </a:rPr>
+                <a:t> = (</a:t>
+              </a:r>
+              <a:r>
+                <a:rPr lang="en-CA" sz="3200" u="sng" dirty="0" err="1">
                   <a:latin typeface="Constantia" panose="02030602050306030303" pitchFamily="18" charset="0"/>
                 </a:rPr>
                 <a:t>a|b</a:t>
               </a:r>
               <a:r>
-                <a:rPr lang="en-CA" sz="3600" dirty="0">
+                <a:rPr lang="en-CA" sz="3200" u="sng" dirty="0">
                   <a:latin typeface="Constantia" panose="02030602050306030303" pitchFamily="18" charset="0"/>
                 </a:rPr>
-                <a:t>)a*, s = “ab”</a:t>
+                <a:t>)a*, </a:t>
+              </a:r>
+              <a:r>
+                <a:rPr lang="en-CA" sz="3200" i="1" u="sng" dirty="0">
+                  <a:latin typeface="Constantia" panose="02030602050306030303" pitchFamily="18" charset="0"/>
+                </a:rPr>
+                <a:t>s</a:t>
+              </a:r>
+              <a:r>
+                <a:rPr lang="en-CA" sz="3200" u="sng" dirty="0">
+                  <a:latin typeface="Constantia" panose="02030602050306030303" pitchFamily="18" charset="0"/>
+                </a:rPr>
+                <a:t> = “ab”</a:t>
               </a:r>
             </a:p>
           </p:txBody>
@@ -7461,10 +6214,10 @@
         </p:nvGrpSpPr>
         <p:grpSpPr>
           <a:xfrm>
-            <a:off x="1738271" y="17978781"/>
-            <a:ext cx="7134225" cy="7258885"/>
-            <a:chOff x="2238623" y="18010940"/>
-            <a:chExt cx="7134225" cy="7258885"/>
+            <a:off x="2125027" y="17080925"/>
+            <a:ext cx="7134225" cy="7218820"/>
+            <a:chOff x="2238623" y="18051005"/>
+            <a:chExt cx="7134225" cy="7218820"/>
           </a:xfrm>
         </p:grpSpPr>
         <p:sp>
@@ -7481,8 +6234,8 @@
           </p:nvSpPr>
           <p:spPr>
             <a:xfrm>
-              <a:off x="2441257" y="18010940"/>
-              <a:ext cx="6728958" cy="646331"/>
+              <a:off x="2940952" y="18051005"/>
+              <a:ext cx="5723618" cy="584775"/>
             </a:xfrm>
             <a:prstGeom prst="rect">
               <a:avLst/>
@@ -7496,19 +6249,31 @@
             <a:lstStyle/>
             <a:p>
               <a:r>
-                <a:rPr lang="en-CA" sz="3600" dirty="0">
+                <a:rPr lang="en-CA" sz="3200" u="sng" dirty="0">
                   <a:latin typeface="Constantia" panose="02030602050306030303" pitchFamily="18" charset="0"/>
                 </a:rPr>
-                <a:t>Thompson’s NFA with r = (</a:t>
+                <a:t>Thompson’s NFA for </a:t>
               </a:r>
               <a:r>
-                <a:rPr lang="en-CA" sz="3600" dirty="0" err="1">
+                <a:rPr lang="en-CA" sz="3200" i="1" u="sng" dirty="0">
+                  <a:latin typeface="Constantia" panose="02030602050306030303" pitchFamily="18" charset="0"/>
+                </a:rPr>
+                <a:t>r</a:t>
+              </a:r>
+              <a:r>
+                <a:rPr lang="en-CA" sz="3200" u="sng" dirty="0">
+                  <a:latin typeface="Constantia" panose="02030602050306030303" pitchFamily="18" charset="0"/>
+                </a:rPr>
+                <a:t> = (</a:t>
+              </a:r>
+              <a:r>
+                <a:rPr lang="en-CA" sz="3200" u="sng" dirty="0" err="1">
                   <a:latin typeface="Constantia" panose="02030602050306030303" pitchFamily="18" charset="0"/>
                 </a:rPr>
                 <a:t>a|b</a:t>
               </a:r>
               <a:r>
-                <a:rPr lang="en-CA" sz="3600" dirty="0">
+                <a:rPr lang="en-CA" sz="3200" u="sng" dirty="0">
                   <a:latin typeface="Constantia" panose="02030602050306030303" pitchFamily="18" charset="0"/>
                 </a:rPr>
                 <a:t>)a*</a:t>
@@ -7531,7 +6296,7 @@
             <p:nvPr/>
           </p:nvPicPr>
           <p:blipFill>
-            <a:blip r:embed="rId8">
+            <a:blip r:embed="rId7">
               <a:extLst>
                 <a:ext uri="{28A0092B-C50C-407E-A947-70E740481C1C}">
                   <a14:useLocalDpi xmlns:a14="http://schemas.microsoft.com/office/drawing/2010/main" val="0"/>
@@ -7553,6 +6318,38 @@
           </p:spPr>
         </p:pic>
       </p:grpSp>
+      <p:sp>
+        <p:nvSpPr>
+          <p:cNvPr id="6" name="Content Placeholder 5">
+            <a:extLst>
+              <a:ext uri="{FF2B5EF4-FFF2-40B4-BE49-F238E27FC236}">
+                <a16:creationId xmlns:a16="http://schemas.microsoft.com/office/drawing/2014/main" id="{2D4885BC-F8B3-4EB8-824F-CF25BDC84011}"/>
+              </a:ext>
+            </a:extLst>
+          </p:cNvPr>
+          <p:cNvSpPr>
+            <a:spLocks noGrp="1"/>
+          </p:cNvSpPr>
+          <p:nvPr>
+            <p:ph sz="quarter" idx="33"/>
+          </p:nvPr>
+        </p:nvSpPr>
+        <p:spPr/>
+        <p:txBody>
+          <a:bodyPr>
+            <a:normAutofit/>
+          </a:bodyPr>
+          <a:lstStyle/>
+          <a:p>
+            <a:r>
+              <a:rPr lang="en-CA" sz="2400" dirty="0">
+                <a:latin typeface="Constantia" panose="02030602050306030303" pitchFamily="18" charset="0"/>
+              </a:rPr>
+              <a:t>Testing environment details</a:t>
+            </a:r>
+          </a:p>
+        </p:txBody>
+      </p:sp>
     </p:spTree>
     <p:extLst>
       <p:ext uri="{BB962C8B-B14F-4D97-AF65-F5344CB8AC3E}">

</xml_diff>